<commit_message>
Get working on Windows
</commit_message>
<xml_diff>
--- a/Template.pptx
+++ b/Template.pptx
@@ -526,7 +526,22 @@
           </a:p>
           <a:p>
             <a:r>
-              <a:rPr lang="en-US" smtClean="0"/>
+              <a:rPr lang="en-US" dirty="0" smtClean="0"/>
+              <a:t>Eternal Father, Strong </a:t>
+            </a:r>
+            <a:r>
+              <a:rPr lang="en-US" smtClean="0"/>
+              <a:t>to </a:t>
+            </a:r>
+            <a:r>
+              <a:rPr lang="en-US" smtClean="0"/>
+              <a:t>Save</a:t>
+            </a:r>
+            <a:endParaRPr lang="en-US" dirty="0" smtClean="0"/>
+          </a:p>
+          <a:p>
+            <a:r>
+              <a:rPr lang="en-US" dirty="0" smtClean="0"/>
               <a:t>Cry of My Heart</a:t>
             </a:r>
             <a:endParaRPr lang="en-US" dirty="0"/>

</xml_diff>

<commit_message>
More intelligent matching algo
</commit_message>
<xml_diff>
--- a/Template.pptx
+++ b/Template.pptx
@@ -194,7 +194,7 @@
             <a:fld id="{BD15AD77-405B-43BA-BE9E-D49BF78CEBB7}" type="datetimeFigureOut">
               <a:rPr lang="en-US" smtClean="0"/>
               <a:pPr/>
-              <a:t>5/16/16</a:t>
+              <a:t>5/20/16</a:t>
             </a:fld>
             <a:endParaRPr lang="en-US"/>
           </a:p>
@@ -527,17 +527,25 @@
           <a:p>
             <a:r>
               <a:rPr lang="en-US" dirty="0" smtClean="0"/>
-              <a:t>Eternal Father, Strong </a:t>
-            </a:r>
-            <a:r>
-              <a:rPr lang="en-US" smtClean="0"/>
-              <a:t>to </a:t>
-            </a:r>
-            <a:r>
-              <a:rPr lang="en-US" smtClean="0"/>
-              <a:t>Save</a:t>
+              <a:t>Like a </a:t>
+            </a:r>
+            <a:r>
+              <a:rPr lang="en-US" dirty="0" smtClean="0"/>
+              <a:t>River</a:t>
+            </a:r>
+          </a:p>
+          <a:p>
+            <a:r>
+              <a:rPr lang="en-US" smtClean="0"/>
+              <a:t>Your Love Never Fails</a:t>
             </a:r>
             <a:endParaRPr lang="en-US" dirty="0" smtClean="0"/>
+          </a:p>
+          <a:p>
+            <a:r>
+              <a:rPr lang="en-US" dirty="0" smtClean="0"/>
+              <a:t>Eternal Father, Strong to Save</a:t>
+            </a:r>
           </a:p>
           <a:p>
             <a:r>
@@ -719,7 +727,7 @@
             <a:fld id="{A10FC231-724A-4425-AC6C-288FCEF1AF0A}" type="datetimeFigureOut">
               <a:rPr lang="en-US" smtClean="0"/>
               <a:pPr/>
-              <a:t>5/16/16</a:t>
+              <a:t>5/20/16</a:t>
             </a:fld>
             <a:endParaRPr lang="en-US"/>
           </a:p>
@@ -904,7 +912,7 @@
             <a:fld id="{A10FC231-724A-4425-AC6C-288FCEF1AF0A}" type="datetimeFigureOut">
               <a:rPr lang="en-US" smtClean="0"/>
               <a:pPr/>
-              <a:t>5/16/16</a:t>
+              <a:t>5/20/16</a:t>
             </a:fld>
             <a:endParaRPr lang="en-US"/>
           </a:p>
@@ -1099,7 +1107,7 @@
             <a:fld id="{A10FC231-724A-4425-AC6C-288FCEF1AF0A}" type="datetimeFigureOut">
               <a:rPr lang="en-US" smtClean="0"/>
               <a:pPr/>
-              <a:t>5/16/16</a:t>
+              <a:t>5/20/16</a:t>
             </a:fld>
             <a:endParaRPr lang="en-US"/>
           </a:p>
@@ -1284,7 +1292,7 @@
             <a:fld id="{A10FC231-724A-4425-AC6C-288FCEF1AF0A}" type="datetimeFigureOut">
               <a:rPr lang="en-US" smtClean="0"/>
               <a:pPr/>
-              <a:t>5/16/16</a:t>
+              <a:t>5/20/16</a:t>
             </a:fld>
             <a:endParaRPr lang="en-US"/>
           </a:p>
@@ -1491,7 +1499,7 @@
             <a:fld id="{A10FC231-724A-4425-AC6C-288FCEF1AF0A}" type="datetimeFigureOut">
               <a:rPr lang="en-US" smtClean="0"/>
               <a:pPr/>
-              <a:t>5/16/16</a:t>
+              <a:t>5/20/16</a:t>
             </a:fld>
             <a:endParaRPr lang="en-US"/>
           </a:p>
@@ -1794,7 +1802,7 @@
             <a:fld id="{A10FC231-724A-4425-AC6C-288FCEF1AF0A}" type="datetimeFigureOut">
               <a:rPr lang="en-US" smtClean="0"/>
               <a:pPr/>
-              <a:t>5/16/16</a:t>
+              <a:t>5/20/16</a:t>
             </a:fld>
             <a:endParaRPr lang="en-US"/>
           </a:p>
@@ -2231,7 +2239,7 @@
             <a:fld id="{A10FC231-724A-4425-AC6C-288FCEF1AF0A}" type="datetimeFigureOut">
               <a:rPr lang="en-US" smtClean="0"/>
               <a:pPr/>
-              <a:t>5/16/16</a:t>
+              <a:t>5/20/16</a:t>
             </a:fld>
             <a:endParaRPr lang="en-US"/>
           </a:p>
@@ -2364,7 +2372,7 @@
             <a:fld id="{A10FC231-724A-4425-AC6C-288FCEF1AF0A}" type="datetimeFigureOut">
               <a:rPr lang="en-US" smtClean="0"/>
               <a:pPr/>
-              <a:t>5/16/16</a:t>
+              <a:t>5/20/16</a:t>
             </a:fld>
             <a:endParaRPr lang="en-US"/>
           </a:p>
@@ -2474,7 +2482,7 @@
             <a:fld id="{A10FC231-724A-4425-AC6C-288FCEF1AF0A}" type="datetimeFigureOut">
               <a:rPr lang="en-US" smtClean="0"/>
               <a:pPr/>
-              <a:t>5/16/16</a:t>
+              <a:t>5/20/16</a:t>
             </a:fld>
             <a:endParaRPr lang="en-US"/>
           </a:p>
@@ -2766,7 +2774,7 @@
             <a:fld id="{A10FC231-724A-4425-AC6C-288FCEF1AF0A}" type="datetimeFigureOut">
               <a:rPr lang="en-US" smtClean="0"/>
               <a:pPr/>
-              <a:t>5/16/16</a:t>
+              <a:t>5/20/16</a:t>
             </a:fld>
             <a:endParaRPr lang="en-US"/>
           </a:p>
@@ -3038,7 +3046,7 @@
             <a:fld id="{A10FC231-724A-4425-AC6C-288FCEF1AF0A}" type="datetimeFigureOut">
               <a:rPr lang="en-US" smtClean="0"/>
               <a:pPr/>
-              <a:t>5/16/16</a:t>
+              <a:t>5/20/16</a:t>
             </a:fld>
             <a:endParaRPr lang="en-US"/>
           </a:p>
@@ -3293,7 +3301,7 @@
             <a:fld id="{A10FC231-724A-4425-AC6C-288FCEF1AF0A}" type="datetimeFigureOut">
               <a:rPr lang="en-US" smtClean="0"/>
               <a:pPr/>
-              <a:t>5/16/16</a:t>
+              <a:t>5/20/16</a:t>
             </a:fld>
             <a:endParaRPr lang="en-US"/>
           </a:p>

</xml_diff>

<commit_message>
More edge-case example songs - @todo: test on windows
</commit_message>
<xml_diff>
--- a/Template.pptx
+++ b/Template.pptx
@@ -511,10 +511,108 @@
           <a:p>
             <a:r>
               <a:rPr lang="en-US" dirty="0" smtClean="0"/>
-              <a:t>A Cross Upon a Hillside</a:t>
-            </a:r>
-          </a:p>
-          <a:p>
+              <a:t>Our Love is Loud</a:t>
+            </a:r>
+          </a:p>
+          <a:p>
+            <a:pPr marL="0" marR="0" indent="0" algn="l" defTabSz="914400" rtl="0" eaLnBrk="1" fontAlgn="auto" latinLnBrk="0" hangingPunct="1">
+              <a:lnSpc>
+                <a:spcPct val="100000"/>
+              </a:lnSpc>
+              <a:spcBef>
+                <a:spcPts val="0"/>
+              </a:spcBef>
+              <a:spcAft>
+                <a:spcPts val="0"/>
+              </a:spcAft>
+              <a:buClrTx/>
+              <a:buSzTx/>
+              <a:buFontTx/>
+              <a:buNone/>
+              <a:tabLst/>
+              <a:defRPr/>
+            </a:pPr>
+            <a:r>
+              <a:rPr lang="en-US" dirty="0" smtClean="0"/>
+              <a:t>Your Love Never Fails</a:t>
+            </a:r>
+          </a:p>
+          <a:p>
+            <a:pPr marL="0" marR="0" indent="0" algn="l" defTabSz="914400" rtl="0" eaLnBrk="1" fontAlgn="auto" latinLnBrk="0" hangingPunct="1">
+              <a:lnSpc>
+                <a:spcPct val="100000"/>
+              </a:lnSpc>
+              <a:spcBef>
+                <a:spcPts val="0"/>
+              </a:spcBef>
+              <a:spcAft>
+                <a:spcPts val="0"/>
+              </a:spcAft>
+              <a:buClrTx/>
+              <a:buSzTx/>
+              <a:buFontTx/>
+              <a:buNone/>
+              <a:tabLst/>
+              <a:defRPr/>
+            </a:pPr>
+            <a:r>
+              <a:rPr lang="en-US" dirty="0" smtClean="0"/>
+              <a:t>Like</a:t>
+            </a:r>
+            <a:r>
+              <a:rPr lang="en-US" baseline="0" dirty="0" smtClean="0"/>
+              <a:t> a River</a:t>
+            </a:r>
+            <a:endParaRPr lang="en-US" dirty="0" smtClean="0"/>
+          </a:p>
+          <a:p>
+            <a:r>
+              <a:rPr lang="en-US" dirty="0" smtClean="0"/>
+              <a:t>His Love</a:t>
+            </a:r>
+          </a:p>
+          <a:p>
+            <a:r>
+              <a:rPr lang="en-US" dirty="0" smtClean="0"/>
+              <a:t>How Deep the Father’s Love for Us</a:t>
+            </a:r>
+          </a:p>
+          <a:p>
+            <a:r>
+              <a:rPr lang="en-US" dirty="0" smtClean="0"/>
+              <a:t>Only You</a:t>
+            </a:r>
+          </a:p>
+          <a:p>
+            <a:r>
+              <a:rPr lang="en-US" dirty="0" smtClean="0"/>
+              <a:t>Furious</a:t>
+            </a:r>
+          </a:p>
+          <a:p>
+            <a:r>
+              <a:rPr lang="en-US" dirty="0" smtClean="0"/>
+              <a:t>Stronger</a:t>
+            </a:r>
+          </a:p>
+          <a:p>
+            <a:pPr marL="0" marR="0" indent="0" algn="l" defTabSz="914400" rtl="0" eaLnBrk="1" fontAlgn="auto" latinLnBrk="0" hangingPunct="1">
+              <a:lnSpc>
+                <a:spcPct val="100000"/>
+              </a:lnSpc>
+              <a:spcBef>
+                <a:spcPts val="0"/>
+              </a:spcBef>
+              <a:spcAft>
+                <a:spcPts val="0"/>
+              </a:spcAft>
+              <a:buClrTx/>
+              <a:buSzTx/>
+              <a:buFontTx/>
+              <a:buNone/>
+              <a:tabLst/>
+              <a:defRPr/>
+            </a:pPr>
             <a:r>
               <a:rPr lang="en-US" dirty="0" err="1" smtClean="0"/>
               <a:t>Youre</a:t>
@@ -523,29 +621,7 @@
               <a:rPr lang="en-US" dirty="0" smtClean="0"/>
               <a:t> Beautiful</a:t>
             </a:r>
-          </a:p>
-          <a:p>
-            <a:r>
-              <a:rPr lang="en-US" dirty="0" smtClean="0"/>
-              <a:t>Like a </a:t>
-            </a:r>
-            <a:r>
-              <a:rPr lang="en-US" dirty="0" smtClean="0"/>
-              <a:t>River</a:t>
-            </a:r>
-          </a:p>
-          <a:p>
-            <a:r>
-              <a:rPr lang="en-US" smtClean="0"/>
-              <a:t>Your Love Never Fails</a:t>
-            </a:r>
             <a:endParaRPr lang="en-US" dirty="0" smtClean="0"/>
-          </a:p>
-          <a:p>
-            <a:r>
-              <a:rPr lang="en-US" dirty="0" smtClean="0"/>
-              <a:t>Eternal Father, Strong to Save</a:t>
-            </a:r>
           </a:p>
           <a:p>
             <a:r>

</xml_diff>